<commit_message>
Puntjes van Sprint 0 presentatie
</commit_message>
<xml_diff>
--- a/Presentaties/Sprint 0.pptx
+++ b/Presentaties/Sprint 0.pptx
@@ -9233,7 +9233,7 @@
           <a:p>
             <a:r>
               <a:rPr lang="nl-NL" dirty="0"/>
-              <a:t>Product </a:t>
+              <a:t>Concept product </a:t>
             </a:r>
             <a:r>
               <a:rPr lang="nl-NL" dirty="0" err="1"/>
@@ -9734,23 +9734,6 @@
 </file>
 
 <file path=customXml/item1.xml><?xml version="1.0" encoding="utf-8"?>
-<p:properties xmlns:p="http://schemas.microsoft.com/office/2006/metadata/properties" xmlns:xsi="http://www.w3.org/2001/XMLSchema-instance" xmlns:pc="http://schemas.microsoft.com/office/infopath/2007/PartnerControls">
-  <documentManagement>
-    <_activity xmlns="8d5dcd13-9b93-4860-8686-258dec0e23be" xsi:nil="true"/>
-  </documentManagement>
-</p:properties>
-</file>
-
-<file path=customXml/item2.xml><?xml version="1.0" encoding="utf-8"?>
-<?mso-contentType ?>
-<FormTemplates xmlns="http://schemas.microsoft.com/sharepoint/v3/contenttype/forms">
-  <Display>DocumentLibraryForm</Display>
-  <Edit>DocumentLibraryForm</Edit>
-  <New>DocumentLibraryForm</New>
-</FormTemplates>
-</file>
-
-<file path=customXml/item3.xml><?xml version="1.0" encoding="utf-8"?>
 <ct:contentTypeSchema xmlns:ct="http://schemas.microsoft.com/office/2006/metadata/contentType" xmlns:ma="http://schemas.microsoft.com/office/2006/metadata/properties/metaAttributes" ct:_="" ma:_="" ma:contentTypeName="Document" ma:contentTypeID="0x01010079D7DB9D69D51D4199EBB83E098F6C13" ma:contentTypeVersion="12" ma:contentTypeDescription="Create a new document." ma:contentTypeScope="" ma:versionID="ceb163bb5f87e201cdc653da3b4d8be7">
   <xsd:schema xmlns:xsd="http://www.w3.org/2001/XMLSchema" xmlns:xs="http://www.w3.org/2001/XMLSchema" xmlns:p="http://schemas.microsoft.com/office/2006/metadata/properties" xmlns:ns3="8d5dcd13-9b93-4860-8686-258dec0e23be" targetNamespace="http://schemas.microsoft.com/office/2006/metadata/properties" ma:root="true" ma:fieldsID="28cc82626ae761b4ac7541494d6f1d1e" ns3:_="">
     <xsd:import namespace="8d5dcd13-9b93-4860-8686-258dec0e23be"/>
@@ -9944,31 +9927,24 @@
 </ct:contentTypeSchema>
 </file>
 
-<file path=customXml/itemProps1.xml><?xml version="1.0" encoding="utf-8"?>
-<ds:datastoreItem xmlns:ds="http://schemas.openxmlformats.org/officeDocument/2006/customXml" ds:itemID="{6BE63DC0-0E79-4D45-AB99-081F8145E24C}">
-  <ds:schemaRefs>
-    <ds:schemaRef ds:uri="http://purl.org/dc/terms/"/>
-    <ds:schemaRef ds:uri="http://schemas.microsoft.com/office/infopath/2007/PartnerControls"/>
-    <ds:schemaRef ds:uri="http://schemas.openxmlformats.org/package/2006/metadata/core-properties"/>
-    <ds:schemaRef ds:uri="http://purl.org/dc/elements/1.1/"/>
-    <ds:schemaRef ds:uri="http://schemas.microsoft.com/office/2006/documentManagement/types"/>
-    <ds:schemaRef ds:uri="http://www.w3.org/XML/1998/namespace"/>
-    <ds:schemaRef ds:uri="8d5dcd13-9b93-4860-8686-258dec0e23be"/>
-    <ds:schemaRef ds:uri="http://schemas.microsoft.com/office/2006/metadata/properties"/>
-    <ds:schemaRef ds:uri="http://purl.org/dc/dcmitype/"/>
-  </ds:schemaRefs>
-</ds:datastoreItem>
+<file path=customXml/item2.xml><?xml version="1.0" encoding="utf-8"?>
+<?mso-contentType ?>
+<FormTemplates xmlns="http://schemas.microsoft.com/sharepoint/v3/contenttype/forms">
+  <Display>DocumentLibraryForm</Display>
+  <Edit>DocumentLibraryForm</Edit>
+  <New>DocumentLibraryForm</New>
+</FormTemplates>
 </file>
 
-<file path=customXml/itemProps2.xml><?xml version="1.0" encoding="utf-8"?>
-<ds:datastoreItem xmlns:ds="http://schemas.openxmlformats.org/officeDocument/2006/customXml" ds:itemID="{33D4CFAA-434D-4462-B62D-1E23E4045646}">
-  <ds:schemaRefs>
-    <ds:schemaRef ds:uri="http://schemas.microsoft.com/sharepoint/v3/contenttype/forms"/>
-  </ds:schemaRefs>
-</ds:datastoreItem>
+<file path=customXml/item3.xml><?xml version="1.0" encoding="utf-8"?>
+<p:properties xmlns:p="http://schemas.microsoft.com/office/2006/metadata/properties" xmlns:xsi="http://www.w3.org/2001/XMLSchema-instance" xmlns:pc="http://schemas.microsoft.com/office/infopath/2007/PartnerControls">
+  <documentManagement>
+    <_activity xmlns="8d5dcd13-9b93-4860-8686-258dec0e23be" xsi:nil="true"/>
+  </documentManagement>
+</p:properties>
 </file>
 
-<file path=customXml/itemProps3.xml><?xml version="1.0" encoding="utf-8"?>
+<file path=customXml/itemProps1.xml><?xml version="1.0" encoding="utf-8"?>
 <ds:datastoreItem xmlns:ds="http://schemas.openxmlformats.org/officeDocument/2006/customXml" ds:itemID="{7685628E-9CEE-488E-843E-DA0262089D08}">
   <ds:schemaRefs>
     <ds:schemaRef ds:uri="http://schemas.microsoft.com/office/2006/metadata/contentType"/>
@@ -9984,4 +9960,28 @@
     <ds:schemaRef ds:uri="http://schemas.microsoft.com/internal/obd"/>
   </ds:schemaRefs>
 </ds:datastoreItem>
+</file>
+
+<file path=customXml/itemProps2.xml><?xml version="1.0" encoding="utf-8"?>
+<ds:datastoreItem xmlns:ds="http://schemas.openxmlformats.org/officeDocument/2006/customXml" ds:itemID="{33D4CFAA-434D-4462-B62D-1E23E4045646}">
+  <ds:schemaRefs>
+    <ds:schemaRef ds:uri="http://schemas.microsoft.com/sharepoint/v3/contenttype/forms"/>
+  </ds:schemaRefs>
+</ds:datastoreItem>
+</file>
+
+<file path=customXml/itemProps3.xml><?xml version="1.0" encoding="utf-8"?>
+<ds:datastoreItem xmlns:ds="http://schemas.openxmlformats.org/officeDocument/2006/customXml" ds:itemID="{6BE63DC0-0E79-4D45-AB99-081F8145E24C}">
+  <ds:schemaRefs>
+    <ds:schemaRef ds:uri="http://purl.org/dc/terms/"/>
+    <ds:schemaRef ds:uri="http://schemas.microsoft.com/office/infopath/2007/PartnerControls"/>
+    <ds:schemaRef ds:uri="http://schemas.openxmlformats.org/package/2006/metadata/core-properties"/>
+    <ds:schemaRef ds:uri="http://purl.org/dc/elements/1.1/"/>
+    <ds:schemaRef ds:uri="http://schemas.microsoft.com/office/2006/documentManagement/types"/>
+    <ds:schemaRef ds:uri="http://www.w3.org/XML/1998/namespace"/>
+    <ds:schemaRef ds:uri="8d5dcd13-9b93-4860-8686-258dec0e23be"/>
+    <ds:schemaRef ds:uri="http://schemas.microsoft.com/office/2006/metadata/properties"/>
+    <ds:schemaRef ds:uri="http://purl.org/dc/dcmitype/"/>
+  </ds:schemaRefs>
+</ds:datastoreItem>
 </file>
</xml_diff>

<commit_message>
Aanpassingen Presentatie sprint 0 (nogmaals)
</commit_message>
<xml_diff>
--- a/Presentaties/Sprint 0.pptx
+++ b/Presentaties/Sprint 0.pptx
@@ -6,13 +6,16 @@
   </p:sldMasterIdLst>
   <p:sldIdLst>
     <p:sldId id="256" r:id="rId5"/>
-    <p:sldId id="257" r:id="rId6"/>
-    <p:sldId id="258" r:id="rId7"/>
-    <p:sldId id="259" r:id="rId8"/>
-    <p:sldId id="260" r:id="rId9"/>
-    <p:sldId id="262" r:id="rId10"/>
-    <p:sldId id="263" r:id="rId11"/>
-    <p:sldId id="264" r:id="rId12"/>
+    <p:sldId id="265" r:id="rId6"/>
+    <p:sldId id="266" r:id="rId7"/>
+    <p:sldId id="257" r:id="rId8"/>
+    <p:sldId id="258" r:id="rId9"/>
+    <p:sldId id="259" r:id="rId10"/>
+    <p:sldId id="260" r:id="rId11"/>
+    <p:sldId id="262" r:id="rId12"/>
+    <p:sldId id="267" r:id="rId13"/>
+    <p:sldId id="263" r:id="rId14"/>
+    <p:sldId id="264" r:id="rId15"/>
   </p:sldIdLst>
   <p:sldSz cx="12192000" cy="6858000"/>
   <p:notesSz cx="6858000" cy="9144000"/>
@@ -8550,7 +8553,397 @@
 </p:sld>
 </file>
 
+<file path=ppt/slides/slide10.xml><?xml version="1.0" encoding="utf-8"?>
+<p:sld xmlns:a="http://schemas.openxmlformats.org/drawingml/2006/main" xmlns:r="http://schemas.openxmlformats.org/officeDocument/2006/relationships" xmlns:p="http://schemas.openxmlformats.org/presentationml/2006/main">
+  <p:cSld>
+    <p:spTree>
+      <p:nvGrpSpPr>
+        <p:cNvPr id="1" name=""/>
+        <p:cNvGrpSpPr/>
+        <p:nvPr/>
+      </p:nvGrpSpPr>
+      <p:grpSpPr>
+        <a:xfrm>
+          <a:off x="0" y="0"/>
+          <a:ext cx="0" cy="0"/>
+          <a:chOff x="0" y="0"/>
+          <a:chExt cx="0" cy="0"/>
+        </a:xfrm>
+      </p:grpSpPr>
+      <p:sp>
+        <p:nvSpPr>
+          <p:cNvPr id="2" name="Title 1">
+            <a:extLst>
+              <a:ext uri="{FF2B5EF4-FFF2-40B4-BE49-F238E27FC236}">
+                <a16:creationId xmlns:a16="http://schemas.microsoft.com/office/drawing/2014/main" id="{B90C89E1-D74D-5A9F-57D4-8DA7038326EE}"/>
+              </a:ext>
+            </a:extLst>
+          </p:cNvPr>
+          <p:cNvSpPr>
+            <a:spLocks noGrp="1"/>
+          </p:cNvSpPr>
+          <p:nvPr>
+            <p:ph type="title"/>
+          </p:nvPr>
+        </p:nvSpPr>
+        <p:spPr/>
+        <p:txBody>
+          <a:bodyPr/>
+          <a:lstStyle/>
+          <a:p>
+            <a:r>
+              <a:rPr lang="nl-NL" dirty="0"/>
+              <a:t>Volgende Sprint</a:t>
+            </a:r>
+          </a:p>
+        </p:txBody>
+      </p:sp>
+      <p:sp>
+        <p:nvSpPr>
+          <p:cNvPr id="3" name="Content Placeholder 2">
+            <a:extLst>
+              <a:ext uri="{FF2B5EF4-FFF2-40B4-BE49-F238E27FC236}">
+                <a16:creationId xmlns:a16="http://schemas.microsoft.com/office/drawing/2014/main" id="{06D64264-81B9-BCB7-DCFB-954A8780EB32}"/>
+              </a:ext>
+            </a:extLst>
+          </p:cNvPr>
+          <p:cNvSpPr>
+            <a:spLocks noGrp="1"/>
+          </p:cNvSpPr>
+          <p:nvPr>
+            <p:ph idx="1"/>
+          </p:nvPr>
+        </p:nvSpPr>
+        <p:spPr/>
+        <p:txBody>
+          <a:bodyPr/>
+          <a:lstStyle/>
+          <a:p>
+            <a:r>
+              <a:rPr lang="nl-NL" dirty="0"/>
+              <a:t>Meeting opdrachtgever</a:t>
+            </a:r>
+          </a:p>
+          <a:p>
+            <a:r>
+              <a:rPr lang="nl-NL" dirty="0" err="1"/>
+              <a:t>Requirements</a:t>
+            </a:r>
+            <a:r>
+              <a:rPr lang="nl-NL" dirty="0"/>
+              <a:t> opstellen</a:t>
+            </a:r>
+          </a:p>
+          <a:p>
+            <a:r>
+              <a:rPr lang="nl-NL" dirty="0"/>
+              <a:t>Product </a:t>
+            </a:r>
+            <a:r>
+              <a:rPr lang="nl-NL" dirty="0" err="1"/>
+              <a:t>backlog</a:t>
+            </a:r>
+            <a:r>
+              <a:rPr lang="nl-NL" dirty="0"/>
+              <a:t> invullen</a:t>
+            </a:r>
+          </a:p>
+          <a:p>
+            <a:endParaRPr lang="nl-NL" dirty="0"/>
+          </a:p>
+        </p:txBody>
+      </p:sp>
+    </p:spTree>
+    <p:extLst>
+      <p:ext uri="{BB962C8B-B14F-4D97-AF65-F5344CB8AC3E}">
+        <p14:creationId xmlns:p14="http://schemas.microsoft.com/office/powerpoint/2010/main" val="1714042999"/>
+      </p:ext>
+    </p:extLst>
+  </p:cSld>
+  <p:clrMapOvr>
+    <a:masterClrMapping/>
+  </p:clrMapOvr>
+</p:sld>
+</file>
+
+<file path=ppt/slides/slide11.xml><?xml version="1.0" encoding="utf-8"?>
+<p:sld xmlns:a="http://schemas.openxmlformats.org/drawingml/2006/main" xmlns:r="http://schemas.openxmlformats.org/officeDocument/2006/relationships" xmlns:p="http://schemas.openxmlformats.org/presentationml/2006/main">
+  <p:cSld>
+    <p:spTree>
+      <p:nvGrpSpPr>
+        <p:cNvPr id="1" name=""/>
+        <p:cNvGrpSpPr/>
+        <p:nvPr/>
+      </p:nvGrpSpPr>
+      <p:grpSpPr>
+        <a:xfrm>
+          <a:off x="0" y="0"/>
+          <a:ext cx="0" cy="0"/>
+          <a:chOff x="0" y="0"/>
+          <a:chExt cx="0" cy="0"/>
+        </a:xfrm>
+      </p:grpSpPr>
+      <p:sp>
+        <p:nvSpPr>
+          <p:cNvPr id="2" name="Title 1">
+            <a:extLst>
+              <a:ext uri="{FF2B5EF4-FFF2-40B4-BE49-F238E27FC236}">
+                <a16:creationId xmlns:a16="http://schemas.microsoft.com/office/drawing/2014/main" id="{2CB8C221-29AC-C68A-DE18-FFAB64C299EB}"/>
+              </a:ext>
+            </a:extLst>
+          </p:cNvPr>
+          <p:cNvSpPr>
+            <a:spLocks noGrp="1"/>
+          </p:cNvSpPr>
+          <p:nvPr>
+            <p:ph type="title"/>
+          </p:nvPr>
+        </p:nvSpPr>
+        <p:spPr/>
+        <p:txBody>
+          <a:bodyPr/>
+          <a:lstStyle/>
+          <a:p>
+            <a:r>
+              <a:rPr lang="nl-NL" dirty="0"/>
+              <a:t>Vragen?</a:t>
+            </a:r>
+          </a:p>
+        </p:txBody>
+      </p:sp>
+      <p:sp>
+        <p:nvSpPr>
+          <p:cNvPr id="3" name="Content Placeholder 2">
+            <a:extLst>
+              <a:ext uri="{FF2B5EF4-FFF2-40B4-BE49-F238E27FC236}">
+                <a16:creationId xmlns:a16="http://schemas.microsoft.com/office/drawing/2014/main" id="{768CC878-EE76-9B51-B735-FB5D5DFB94BA}"/>
+              </a:ext>
+            </a:extLst>
+          </p:cNvPr>
+          <p:cNvSpPr>
+            <a:spLocks noGrp="1"/>
+          </p:cNvSpPr>
+          <p:nvPr>
+            <p:ph idx="1"/>
+          </p:nvPr>
+        </p:nvSpPr>
+        <p:spPr/>
+        <p:txBody>
+          <a:bodyPr/>
+          <a:lstStyle/>
+          <a:p>
+            <a:endParaRPr lang="nl-NL" dirty="0"/>
+          </a:p>
+        </p:txBody>
+      </p:sp>
+    </p:spTree>
+    <p:extLst>
+      <p:ext uri="{BB962C8B-B14F-4D97-AF65-F5344CB8AC3E}">
+        <p14:creationId xmlns:p14="http://schemas.microsoft.com/office/powerpoint/2010/main" val="3103718938"/>
+      </p:ext>
+    </p:extLst>
+  </p:cSld>
+  <p:clrMapOvr>
+    <a:masterClrMapping/>
+  </p:clrMapOvr>
+</p:sld>
+</file>
+
 <file path=ppt/slides/slide2.xml><?xml version="1.0" encoding="utf-8"?>
+<p:sld xmlns:a="http://schemas.openxmlformats.org/drawingml/2006/main" xmlns:r="http://schemas.openxmlformats.org/officeDocument/2006/relationships" xmlns:p="http://schemas.openxmlformats.org/presentationml/2006/main">
+  <p:cSld>
+    <p:spTree>
+      <p:nvGrpSpPr>
+        <p:cNvPr id="1" name=""/>
+        <p:cNvGrpSpPr/>
+        <p:nvPr/>
+      </p:nvGrpSpPr>
+      <p:grpSpPr>
+        <a:xfrm>
+          <a:off x="0" y="0"/>
+          <a:ext cx="0" cy="0"/>
+          <a:chOff x="0" y="0"/>
+          <a:chExt cx="0" cy="0"/>
+        </a:xfrm>
+      </p:grpSpPr>
+      <p:sp>
+        <p:nvSpPr>
+          <p:cNvPr id="2" name="Title 1">
+            <a:extLst>
+              <a:ext uri="{FF2B5EF4-FFF2-40B4-BE49-F238E27FC236}">
+                <a16:creationId xmlns:a16="http://schemas.microsoft.com/office/drawing/2014/main" id="{1D78F68F-96E1-B23F-90FA-7FBF8E3D2D17}"/>
+              </a:ext>
+            </a:extLst>
+          </p:cNvPr>
+          <p:cNvSpPr>
+            <a:spLocks noGrp="1"/>
+          </p:cNvSpPr>
+          <p:nvPr>
+            <p:ph type="title"/>
+          </p:nvPr>
+        </p:nvSpPr>
+        <p:spPr/>
+        <p:txBody>
+          <a:bodyPr/>
+          <a:lstStyle/>
+          <a:p>
+            <a:r>
+              <a:rPr lang="nl-NL" dirty="0"/>
+              <a:t>Wat is het Probleem?</a:t>
+            </a:r>
+          </a:p>
+        </p:txBody>
+      </p:sp>
+      <p:sp>
+        <p:nvSpPr>
+          <p:cNvPr id="3" name="Content Placeholder 2">
+            <a:extLst>
+              <a:ext uri="{FF2B5EF4-FFF2-40B4-BE49-F238E27FC236}">
+                <a16:creationId xmlns:a16="http://schemas.microsoft.com/office/drawing/2014/main" id="{4200DEE1-43C4-2994-7DF7-836DE3EDE3B2}"/>
+              </a:ext>
+            </a:extLst>
+          </p:cNvPr>
+          <p:cNvSpPr>
+            <a:spLocks noGrp="1"/>
+          </p:cNvSpPr>
+          <p:nvPr>
+            <p:ph idx="1"/>
+          </p:nvPr>
+        </p:nvSpPr>
+        <p:spPr/>
+        <p:txBody>
+          <a:bodyPr/>
+          <a:lstStyle/>
+          <a:p>
+            <a:r>
+              <a:rPr lang="nl-NL" dirty="0" err="1"/>
+              <a:t>Floating</a:t>
+            </a:r>
+            <a:r>
+              <a:rPr lang="nl-NL" dirty="0"/>
+              <a:t> farm</a:t>
+            </a:r>
+          </a:p>
+          <a:p>
+            <a:r>
+              <a:rPr lang="nl-NL" dirty="0"/>
+              <a:t>Balans</a:t>
+            </a:r>
+          </a:p>
+          <a:p>
+            <a:r>
+              <a:rPr lang="nl-NL" dirty="0"/>
+              <a:t>Instabiliteit door Koeien</a:t>
+            </a:r>
+          </a:p>
+        </p:txBody>
+      </p:sp>
+    </p:spTree>
+    <p:extLst>
+      <p:ext uri="{BB962C8B-B14F-4D97-AF65-F5344CB8AC3E}">
+        <p14:creationId xmlns:p14="http://schemas.microsoft.com/office/powerpoint/2010/main" val="1904512937"/>
+      </p:ext>
+    </p:extLst>
+  </p:cSld>
+  <p:clrMapOvr>
+    <a:masterClrMapping/>
+  </p:clrMapOvr>
+</p:sld>
+</file>
+
+<file path=ppt/slides/slide3.xml><?xml version="1.0" encoding="utf-8"?>
+<p:sld xmlns:a="http://schemas.openxmlformats.org/drawingml/2006/main" xmlns:r="http://schemas.openxmlformats.org/officeDocument/2006/relationships" xmlns:p="http://schemas.openxmlformats.org/presentationml/2006/main">
+  <p:cSld>
+    <p:spTree>
+      <p:nvGrpSpPr>
+        <p:cNvPr id="1" name=""/>
+        <p:cNvGrpSpPr/>
+        <p:nvPr/>
+      </p:nvGrpSpPr>
+      <p:grpSpPr>
+        <a:xfrm>
+          <a:off x="0" y="0"/>
+          <a:ext cx="0" cy="0"/>
+          <a:chOff x="0" y="0"/>
+          <a:chExt cx="0" cy="0"/>
+        </a:xfrm>
+      </p:grpSpPr>
+      <p:sp>
+        <p:nvSpPr>
+          <p:cNvPr id="2" name="Title 1">
+            <a:extLst>
+              <a:ext uri="{FF2B5EF4-FFF2-40B4-BE49-F238E27FC236}">
+                <a16:creationId xmlns:a16="http://schemas.microsoft.com/office/drawing/2014/main" id="{EC7FB8A5-8B17-BE7F-60E7-6384802539CC}"/>
+              </a:ext>
+            </a:extLst>
+          </p:cNvPr>
+          <p:cNvSpPr>
+            <a:spLocks noGrp="1"/>
+          </p:cNvSpPr>
+          <p:nvPr>
+            <p:ph type="title"/>
+          </p:nvPr>
+        </p:nvSpPr>
+        <p:spPr/>
+        <p:txBody>
+          <a:bodyPr/>
+          <a:lstStyle/>
+          <a:p>
+            <a:r>
+              <a:rPr lang="nl-NL" dirty="0"/>
+              <a:t>Mogelijke oplossingen?</a:t>
+            </a:r>
+          </a:p>
+        </p:txBody>
+      </p:sp>
+      <p:sp>
+        <p:nvSpPr>
+          <p:cNvPr id="3" name="Content Placeholder 2">
+            <a:extLst>
+              <a:ext uri="{FF2B5EF4-FFF2-40B4-BE49-F238E27FC236}">
+                <a16:creationId xmlns:a16="http://schemas.microsoft.com/office/drawing/2014/main" id="{0D9FBBE0-0DF7-E3F0-BC85-5593D5F03B14}"/>
+              </a:ext>
+            </a:extLst>
+          </p:cNvPr>
+          <p:cNvSpPr>
+            <a:spLocks noGrp="1"/>
+          </p:cNvSpPr>
+          <p:nvPr>
+            <p:ph idx="1"/>
+          </p:nvPr>
+        </p:nvSpPr>
+        <p:spPr/>
+        <p:txBody>
+          <a:bodyPr/>
+          <a:lstStyle/>
+          <a:p>
+            <a:r>
+              <a:rPr lang="nl-NL" dirty="0"/>
+              <a:t>Ballasttanks (meerdere varianten)</a:t>
+            </a:r>
+          </a:p>
+          <a:p>
+            <a:r>
+              <a:rPr lang="nl-NL" dirty="0"/>
+              <a:t>Niet zeker want…</a:t>
+            </a:r>
+          </a:p>
+        </p:txBody>
+      </p:sp>
+    </p:spTree>
+    <p:extLst>
+      <p:ext uri="{BB962C8B-B14F-4D97-AF65-F5344CB8AC3E}">
+        <p14:creationId xmlns:p14="http://schemas.microsoft.com/office/powerpoint/2010/main" val="2866406177"/>
+      </p:ext>
+    </p:extLst>
+  </p:cSld>
+  <p:clrMapOvr>
+    <a:masterClrMapping/>
+  </p:clrMapOvr>
+</p:sld>
+</file>
+
+<file path=ppt/slides/slide4.xml><?xml version="1.0" encoding="utf-8"?>
 <p:sld xmlns:a="http://schemas.openxmlformats.org/drawingml/2006/main" xmlns:r="http://schemas.openxmlformats.org/officeDocument/2006/relationships" xmlns:p="http://schemas.openxmlformats.org/presentationml/2006/main" show="0">
   <p:cSld>
     <p:bg>
@@ -8896,172 +9289,6 @@
 </p:sld>
 </file>
 
-<file path=ppt/slides/slide3.xml><?xml version="1.0" encoding="utf-8"?>
-<p:sld xmlns:a="http://schemas.openxmlformats.org/drawingml/2006/main" xmlns:r="http://schemas.openxmlformats.org/officeDocument/2006/relationships" xmlns:p="http://schemas.openxmlformats.org/presentationml/2006/main" show="0">
-  <p:cSld>
-    <p:spTree>
-      <p:nvGrpSpPr>
-        <p:cNvPr id="1" name=""/>
-        <p:cNvGrpSpPr/>
-        <p:nvPr/>
-      </p:nvGrpSpPr>
-      <p:grpSpPr>
-        <a:xfrm>
-          <a:off x="0" y="0"/>
-          <a:ext cx="0" cy="0"/>
-          <a:chOff x="0" y="0"/>
-          <a:chExt cx="0" cy="0"/>
-        </a:xfrm>
-      </p:grpSpPr>
-      <p:sp>
-        <p:nvSpPr>
-          <p:cNvPr id="2" name="Title 1">
-            <a:extLst>
-              <a:ext uri="{FF2B5EF4-FFF2-40B4-BE49-F238E27FC236}">
-                <a16:creationId xmlns:a16="http://schemas.microsoft.com/office/drawing/2014/main" id="{6A297DEE-8A82-8133-814C-C22C9822A41D}"/>
-              </a:ext>
-            </a:extLst>
-          </p:cNvPr>
-          <p:cNvSpPr>
-            <a:spLocks noGrp="1"/>
-          </p:cNvSpPr>
-          <p:nvPr>
-            <p:ph type="title"/>
-          </p:nvPr>
-        </p:nvSpPr>
-        <p:spPr/>
-        <p:txBody>
-          <a:bodyPr/>
-          <a:lstStyle/>
-          <a:p>
-            <a:r>
-              <a:rPr lang="nl-NL" dirty="0"/>
-              <a:t>Afgelopen Sprint</a:t>
-            </a:r>
-          </a:p>
-        </p:txBody>
-      </p:sp>
-      <p:sp>
-        <p:nvSpPr>
-          <p:cNvPr id="3" name="Content Placeholder 2">
-            <a:extLst>
-              <a:ext uri="{FF2B5EF4-FFF2-40B4-BE49-F238E27FC236}">
-                <a16:creationId xmlns:a16="http://schemas.microsoft.com/office/drawing/2014/main" id="{027EC2D2-23D9-2582-009F-C9AA32E67A48}"/>
-              </a:ext>
-            </a:extLst>
-          </p:cNvPr>
-          <p:cNvSpPr>
-            <a:spLocks noGrp="1"/>
-          </p:cNvSpPr>
-          <p:nvPr>
-            <p:ph idx="1"/>
-          </p:nvPr>
-        </p:nvSpPr>
-        <p:spPr/>
-        <p:txBody>
-          <a:bodyPr/>
-          <a:lstStyle/>
-          <a:p>
-            <a:endParaRPr lang="nl-NL"/>
-          </a:p>
-        </p:txBody>
-      </p:sp>
-    </p:spTree>
-    <p:extLst>
-      <p:ext uri="{BB962C8B-B14F-4D97-AF65-F5344CB8AC3E}">
-        <p14:creationId xmlns:p14="http://schemas.microsoft.com/office/powerpoint/2010/main" val="4184478922"/>
-      </p:ext>
-    </p:extLst>
-  </p:cSld>
-  <p:clrMapOvr>
-    <a:masterClrMapping/>
-  </p:clrMapOvr>
-</p:sld>
-</file>
-
-<file path=ppt/slides/slide4.xml><?xml version="1.0" encoding="utf-8"?>
-<p:sld xmlns:a="http://schemas.openxmlformats.org/drawingml/2006/main" xmlns:r="http://schemas.openxmlformats.org/officeDocument/2006/relationships" xmlns:p="http://schemas.openxmlformats.org/presentationml/2006/main" show="0">
-  <p:cSld>
-    <p:spTree>
-      <p:nvGrpSpPr>
-        <p:cNvPr id="1" name=""/>
-        <p:cNvGrpSpPr/>
-        <p:nvPr/>
-      </p:nvGrpSpPr>
-      <p:grpSpPr>
-        <a:xfrm>
-          <a:off x="0" y="0"/>
-          <a:ext cx="0" cy="0"/>
-          <a:chOff x="0" y="0"/>
-          <a:chExt cx="0" cy="0"/>
-        </a:xfrm>
-      </p:grpSpPr>
-      <p:sp>
-        <p:nvSpPr>
-          <p:cNvPr id="2" name="Title 1">
-            <a:extLst>
-              <a:ext uri="{FF2B5EF4-FFF2-40B4-BE49-F238E27FC236}">
-                <a16:creationId xmlns:a16="http://schemas.microsoft.com/office/drawing/2014/main" id="{EC8BCB48-81CE-C17F-4E1B-E16F9FA67892}"/>
-              </a:ext>
-            </a:extLst>
-          </p:cNvPr>
-          <p:cNvSpPr>
-            <a:spLocks noGrp="1"/>
-          </p:cNvSpPr>
-          <p:nvPr>
-            <p:ph type="title"/>
-          </p:nvPr>
-        </p:nvSpPr>
-        <p:spPr/>
-        <p:txBody>
-          <a:bodyPr/>
-          <a:lstStyle/>
-          <a:p>
-            <a:r>
-              <a:rPr lang="nl-NL" dirty="0"/>
-              <a:t>Demo(‘s)</a:t>
-            </a:r>
-          </a:p>
-        </p:txBody>
-      </p:sp>
-      <p:sp>
-        <p:nvSpPr>
-          <p:cNvPr id="3" name="Content Placeholder 2">
-            <a:extLst>
-              <a:ext uri="{FF2B5EF4-FFF2-40B4-BE49-F238E27FC236}">
-                <a16:creationId xmlns:a16="http://schemas.microsoft.com/office/drawing/2014/main" id="{61C39565-22DD-20A2-B34E-1FA28051EFE6}"/>
-              </a:ext>
-            </a:extLst>
-          </p:cNvPr>
-          <p:cNvSpPr>
-            <a:spLocks noGrp="1"/>
-          </p:cNvSpPr>
-          <p:nvPr>
-            <p:ph idx="1"/>
-          </p:nvPr>
-        </p:nvSpPr>
-        <p:spPr/>
-        <p:txBody>
-          <a:bodyPr/>
-          <a:lstStyle/>
-          <a:p>
-            <a:endParaRPr lang="nl-NL"/>
-          </a:p>
-        </p:txBody>
-      </p:sp>
-    </p:spTree>
-    <p:extLst>
-      <p:ext uri="{BB962C8B-B14F-4D97-AF65-F5344CB8AC3E}">
-        <p14:creationId xmlns:p14="http://schemas.microsoft.com/office/powerpoint/2010/main" val="746814274"/>
-      </p:ext>
-    </p:extLst>
-  </p:cSld>
-  <p:clrMapOvr>
-    <a:masterClrMapping/>
-  </p:clrMapOvr>
-</p:sld>
-</file>
-
 <file path=ppt/slides/slide5.xml><?xml version="1.0" encoding="utf-8"?>
 <p:sld xmlns:a="http://schemas.openxmlformats.org/drawingml/2006/main" xmlns:r="http://schemas.openxmlformats.org/officeDocument/2006/relationships" xmlns:p="http://schemas.openxmlformats.org/presentationml/2006/main" show="0">
   <p:cSld>
@@ -9084,7 +9311,7 @@
           <p:cNvPr id="2" name="Title 1">
             <a:extLst>
               <a:ext uri="{FF2B5EF4-FFF2-40B4-BE49-F238E27FC236}">
-                <a16:creationId xmlns:a16="http://schemas.microsoft.com/office/drawing/2014/main" id="{97D098AC-B5A0-ADAE-3ED0-CD81C8B82416}"/>
+                <a16:creationId xmlns:a16="http://schemas.microsoft.com/office/drawing/2014/main" id="{6A297DEE-8A82-8133-814C-C22C9822A41D}"/>
               </a:ext>
             </a:extLst>
           </p:cNvPr>
@@ -9102,15 +9329,7 @@
           <a:p>
             <a:r>
               <a:rPr lang="nl-NL" dirty="0"/>
-              <a:t>Deze User </a:t>
-            </a:r>
-            <a:r>
-              <a:rPr lang="nl-NL" dirty="0" err="1"/>
-              <a:t>Stories</a:t>
-            </a:r>
-            <a:r>
-              <a:rPr lang="nl-NL" dirty="0"/>
-              <a:t> zijn we nog niet aan toegekomen</a:t>
+              <a:t>Afgelopen Sprint</a:t>
             </a:r>
           </a:p>
         </p:txBody>
@@ -9120,7 +9339,7 @@
           <p:cNvPr id="3" name="Content Placeholder 2">
             <a:extLst>
               <a:ext uri="{FF2B5EF4-FFF2-40B4-BE49-F238E27FC236}">
-                <a16:creationId xmlns:a16="http://schemas.microsoft.com/office/drawing/2014/main" id="{4A1E34C3-F127-C91E-62FA-ABE8206DCA77}"/>
+                <a16:creationId xmlns:a16="http://schemas.microsoft.com/office/drawing/2014/main" id="{027EC2D2-23D9-2582-009F-C9AA32E67A48}"/>
               </a:ext>
             </a:extLst>
           </p:cNvPr>
@@ -9136,14 +9355,14 @@
           <a:bodyPr/>
           <a:lstStyle/>
           <a:p>
-            <a:endParaRPr lang="nl-NL" dirty="0"/>
+            <a:endParaRPr lang="nl-NL"/>
           </a:p>
         </p:txBody>
       </p:sp>
     </p:spTree>
     <p:extLst>
       <p:ext uri="{BB962C8B-B14F-4D97-AF65-F5344CB8AC3E}">
-        <p14:creationId xmlns:p14="http://schemas.microsoft.com/office/powerpoint/2010/main" val="2894543031"/>
+        <p14:creationId xmlns:p14="http://schemas.microsoft.com/office/powerpoint/2010/main" val="4184478922"/>
       </p:ext>
     </p:extLst>
   </p:cSld>
@@ -9154,7 +9373,7 @@
 </file>
 
 <file path=ppt/slides/slide6.xml><?xml version="1.0" encoding="utf-8"?>
-<p:sld xmlns:a="http://schemas.openxmlformats.org/drawingml/2006/main" xmlns:r="http://schemas.openxmlformats.org/officeDocument/2006/relationships" xmlns:p="http://schemas.openxmlformats.org/presentationml/2006/main">
+<p:sld xmlns:a="http://schemas.openxmlformats.org/drawingml/2006/main" xmlns:r="http://schemas.openxmlformats.org/officeDocument/2006/relationships" xmlns:p="http://schemas.openxmlformats.org/presentationml/2006/main" show="0">
   <p:cSld>
     <p:spTree>
       <p:nvGrpSpPr>
@@ -9175,7 +9394,7 @@
           <p:cNvPr id="2" name="Title 1">
             <a:extLst>
               <a:ext uri="{FF2B5EF4-FFF2-40B4-BE49-F238E27FC236}">
-                <a16:creationId xmlns:a16="http://schemas.microsoft.com/office/drawing/2014/main" id="{3B316FE2-8D8C-7F98-35F4-2C37C5FA7FDA}"/>
+                <a16:creationId xmlns:a16="http://schemas.microsoft.com/office/drawing/2014/main" id="{EC8BCB48-81CE-C17F-4E1B-E16F9FA67892}"/>
               </a:ext>
             </a:extLst>
           </p:cNvPr>
@@ -9193,7 +9412,7 @@
           <a:p>
             <a:r>
               <a:rPr lang="nl-NL" dirty="0"/>
-              <a:t>Wat hebben we gedaan?</a:t>
+              <a:t>Demo(‘s)</a:t>
             </a:r>
           </a:p>
         </p:txBody>
@@ -9203,7 +9422,7 @@
           <p:cNvPr id="3" name="Content Placeholder 2">
             <a:extLst>
               <a:ext uri="{FF2B5EF4-FFF2-40B4-BE49-F238E27FC236}">
-                <a16:creationId xmlns:a16="http://schemas.microsoft.com/office/drawing/2014/main" id="{D7A0D1E5-C72E-270B-6A56-8AB180F6AB69}"/>
+                <a16:creationId xmlns:a16="http://schemas.microsoft.com/office/drawing/2014/main" id="{61C39565-22DD-20A2-B34E-1FA28051EFE6}"/>
               </a:ext>
             </a:extLst>
           </p:cNvPr>
@@ -9219,59 +9438,14 @@
           <a:bodyPr/>
           <a:lstStyle/>
           <a:p>
-            <a:r>
-              <a:rPr lang="nl-NL" dirty="0"/>
-              <a:t>Ondanks vertraging…</a:t>
-            </a:r>
-          </a:p>
-          <a:p>
-            <a:r>
-              <a:rPr lang="nl-NL" dirty="0"/>
-              <a:t>Samenwerkingsovereenkomst</a:t>
-            </a:r>
-          </a:p>
-          <a:p>
-            <a:r>
-              <a:rPr lang="nl-NL" dirty="0"/>
-              <a:t>Concept product </a:t>
-            </a:r>
-            <a:r>
-              <a:rPr lang="nl-NL" dirty="0" err="1"/>
-              <a:t>backlog</a:t>
-            </a:r>
-            <a:endParaRPr lang="nl-NL" dirty="0"/>
-          </a:p>
-          <a:p>
-            <a:r>
-              <a:rPr lang="nl-NL" dirty="0"/>
-              <a:t>Concept Probleemomschrijving</a:t>
-            </a:r>
-          </a:p>
-          <a:p>
-            <a:r>
-              <a:rPr lang="nl-NL" dirty="0" err="1"/>
-              <a:t>Jira</a:t>
-            </a:r>
-            <a:r>
-              <a:rPr lang="nl-NL" dirty="0"/>
-              <a:t> – Planning</a:t>
-            </a:r>
-          </a:p>
-          <a:p>
-            <a:r>
-              <a:rPr lang="nl-NL" dirty="0"/>
-              <a:t>GitHub</a:t>
-            </a:r>
-          </a:p>
-          <a:p>
-            <a:endParaRPr lang="nl-NL" dirty="0"/>
+            <a:endParaRPr lang="nl-NL"/>
           </a:p>
         </p:txBody>
       </p:sp>
     </p:spTree>
     <p:extLst>
       <p:ext uri="{BB962C8B-B14F-4D97-AF65-F5344CB8AC3E}">
-        <p14:creationId xmlns:p14="http://schemas.microsoft.com/office/powerpoint/2010/main" val="3188886355"/>
+        <p14:creationId xmlns:p14="http://schemas.microsoft.com/office/powerpoint/2010/main" val="746814274"/>
       </p:ext>
     </p:extLst>
   </p:cSld>
@@ -9282,7 +9456,7 @@
 </file>
 
 <file path=ppt/slides/slide7.xml><?xml version="1.0" encoding="utf-8"?>
-<p:sld xmlns:a="http://schemas.openxmlformats.org/drawingml/2006/main" xmlns:r="http://schemas.openxmlformats.org/officeDocument/2006/relationships" xmlns:p="http://schemas.openxmlformats.org/presentationml/2006/main">
+<p:sld xmlns:a="http://schemas.openxmlformats.org/drawingml/2006/main" xmlns:r="http://schemas.openxmlformats.org/officeDocument/2006/relationships" xmlns:p="http://schemas.openxmlformats.org/presentationml/2006/main" show="0">
   <p:cSld>
     <p:spTree>
       <p:nvGrpSpPr>
@@ -9303,7 +9477,7 @@
           <p:cNvPr id="2" name="Title 1">
             <a:extLst>
               <a:ext uri="{FF2B5EF4-FFF2-40B4-BE49-F238E27FC236}">
-                <a16:creationId xmlns:a16="http://schemas.microsoft.com/office/drawing/2014/main" id="{B90C89E1-D74D-5A9F-57D4-8DA7038326EE}"/>
+                <a16:creationId xmlns:a16="http://schemas.microsoft.com/office/drawing/2014/main" id="{97D098AC-B5A0-ADAE-3ED0-CD81C8B82416}"/>
               </a:ext>
             </a:extLst>
           </p:cNvPr>
@@ -9321,7 +9495,15 @@
           <a:p>
             <a:r>
               <a:rPr lang="nl-NL" dirty="0"/>
-              <a:t>Volgende Sprint</a:t>
+              <a:t>Deze User </a:t>
+            </a:r>
+            <a:r>
+              <a:rPr lang="nl-NL" dirty="0" err="1"/>
+              <a:t>Stories</a:t>
+            </a:r>
+            <a:r>
+              <a:rPr lang="nl-NL" dirty="0"/>
+              <a:t> zijn we nog niet aan toegekomen</a:t>
             </a:r>
           </a:p>
         </p:txBody>
@@ -9331,7 +9513,7 @@
           <p:cNvPr id="3" name="Content Placeholder 2">
             <a:extLst>
               <a:ext uri="{FF2B5EF4-FFF2-40B4-BE49-F238E27FC236}">
-                <a16:creationId xmlns:a16="http://schemas.microsoft.com/office/drawing/2014/main" id="{06D64264-81B9-BCB7-DCFB-954A8780EB32}"/>
+                <a16:creationId xmlns:a16="http://schemas.microsoft.com/office/drawing/2014/main" id="{4A1E34C3-F127-C91E-62FA-ABE8206DCA77}"/>
               </a:ext>
             </a:extLst>
           </p:cNvPr>
@@ -9347,36 +9529,6 @@
           <a:bodyPr/>
           <a:lstStyle/>
           <a:p>
-            <a:r>
-              <a:rPr lang="nl-NL" dirty="0"/>
-              <a:t>Meeting opdrachtgever</a:t>
-            </a:r>
-          </a:p>
-          <a:p>
-            <a:r>
-              <a:rPr lang="nl-NL" dirty="0" err="1"/>
-              <a:t>Requirements</a:t>
-            </a:r>
-            <a:r>
-              <a:rPr lang="nl-NL" dirty="0"/>
-              <a:t> opstellen</a:t>
-            </a:r>
-          </a:p>
-          <a:p>
-            <a:r>
-              <a:rPr lang="nl-NL" dirty="0"/>
-              <a:t>Product </a:t>
-            </a:r>
-            <a:r>
-              <a:rPr lang="nl-NL" dirty="0" err="1"/>
-              <a:t>backlog</a:t>
-            </a:r>
-            <a:r>
-              <a:rPr lang="nl-NL" dirty="0"/>
-              <a:t> invullen</a:t>
-            </a:r>
-          </a:p>
-          <a:p>
             <a:endParaRPr lang="nl-NL" dirty="0"/>
           </a:p>
         </p:txBody>
@@ -9384,7 +9536,7 @@
     </p:spTree>
     <p:extLst>
       <p:ext uri="{BB962C8B-B14F-4D97-AF65-F5344CB8AC3E}">
-        <p14:creationId xmlns:p14="http://schemas.microsoft.com/office/powerpoint/2010/main" val="1714042999"/>
+        <p14:creationId xmlns:p14="http://schemas.microsoft.com/office/powerpoint/2010/main" val="2894543031"/>
       </p:ext>
     </p:extLst>
   </p:cSld>
@@ -9416,7 +9568,7 @@
           <p:cNvPr id="2" name="Title 1">
             <a:extLst>
               <a:ext uri="{FF2B5EF4-FFF2-40B4-BE49-F238E27FC236}">
-                <a16:creationId xmlns:a16="http://schemas.microsoft.com/office/drawing/2014/main" id="{2CB8C221-29AC-C68A-DE18-FFAB64C299EB}"/>
+                <a16:creationId xmlns:a16="http://schemas.microsoft.com/office/drawing/2014/main" id="{3B316FE2-8D8C-7F98-35F4-2C37C5FA7FDA}"/>
               </a:ext>
             </a:extLst>
           </p:cNvPr>
@@ -9434,7 +9586,7 @@
           <a:p>
             <a:r>
               <a:rPr lang="nl-NL" dirty="0"/>
-              <a:t>Vragen?</a:t>
+              <a:t>Wat hebben we gedaan?</a:t>
             </a:r>
           </a:p>
         </p:txBody>
@@ -9444,7 +9596,7 @@
           <p:cNvPr id="3" name="Content Placeholder 2">
             <a:extLst>
               <a:ext uri="{FF2B5EF4-FFF2-40B4-BE49-F238E27FC236}">
-                <a16:creationId xmlns:a16="http://schemas.microsoft.com/office/drawing/2014/main" id="{768CC878-EE76-9B51-B735-FB5D5DFB94BA}"/>
+                <a16:creationId xmlns:a16="http://schemas.microsoft.com/office/drawing/2014/main" id="{D7A0D1E5-C72E-270B-6A56-8AB180F6AB69}"/>
               </a:ext>
             </a:extLst>
           </p:cNvPr>
@@ -9460,6 +9612,51 @@
           <a:bodyPr/>
           <a:lstStyle/>
           <a:p>
+            <a:r>
+              <a:rPr lang="nl-NL" dirty="0"/>
+              <a:t>Ondanks vertraging…</a:t>
+            </a:r>
+          </a:p>
+          <a:p>
+            <a:r>
+              <a:rPr lang="nl-NL" dirty="0"/>
+              <a:t>Samenwerkingsovereenkomst</a:t>
+            </a:r>
+          </a:p>
+          <a:p>
+            <a:r>
+              <a:rPr lang="nl-NL" dirty="0"/>
+              <a:t>Concept product </a:t>
+            </a:r>
+            <a:r>
+              <a:rPr lang="nl-NL" dirty="0" err="1"/>
+              <a:t>backlog</a:t>
+            </a:r>
+            <a:endParaRPr lang="nl-NL" dirty="0"/>
+          </a:p>
+          <a:p>
+            <a:r>
+              <a:rPr lang="nl-NL" dirty="0"/>
+              <a:t>Concept Probleemomschrijving</a:t>
+            </a:r>
+          </a:p>
+          <a:p>
+            <a:r>
+              <a:rPr lang="nl-NL" dirty="0" err="1"/>
+              <a:t>Jira</a:t>
+            </a:r>
+            <a:r>
+              <a:rPr lang="nl-NL" dirty="0"/>
+              <a:t> – Planning</a:t>
+            </a:r>
+          </a:p>
+          <a:p>
+            <a:r>
+              <a:rPr lang="nl-NL" dirty="0"/>
+              <a:t>GitHub</a:t>
+            </a:r>
+          </a:p>
+          <a:p>
             <a:endParaRPr lang="nl-NL" dirty="0"/>
           </a:p>
         </p:txBody>
@@ -9467,7 +9664,108 @@
     </p:spTree>
     <p:extLst>
       <p:ext uri="{BB962C8B-B14F-4D97-AF65-F5344CB8AC3E}">
-        <p14:creationId xmlns:p14="http://schemas.microsoft.com/office/powerpoint/2010/main" val="3103718938"/>
+        <p14:creationId xmlns:p14="http://schemas.microsoft.com/office/powerpoint/2010/main" val="3188886355"/>
+      </p:ext>
+    </p:extLst>
+  </p:cSld>
+  <p:clrMapOvr>
+    <a:masterClrMapping/>
+  </p:clrMapOvr>
+</p:sld>
+</file>
+
+<file path=ppt/slides/slide9.xml><?xml version="1.0" encoding="utf-8"?>
+<p:sld xmlns:a="http://schemas.openxmlformats.org/drawingml/2006/main" xmlns:r="http://schemas.openxmlformats.org/officeDocument/2006/relationships" xmlns:p="http://schemas.openxmlformats.org/presentationml/2006/main">
+  <p:cSld>
+    <p:spTree>
+      <p:nvGrpSpPr>
+        <p:cNvPr id="1" name=""/>
+        <p:cNvGrpSpPr/>
+        <p:nvPr/>
+      </p:nvGrpSpPr>
+      <p:grpSpPr>
+        <a:xfrm>
+          <a:off x="0" y="0"/>
+          <a:ext cx="0" cy="0"/>
+          <a:chOff x="0" y="0"/>
+          <a:chExt cx="0" cy="0"/>
+        </a:xfrm>
+      </p:grpSpPr>
+      <p:sp>
+        <p:nvSpPr>
+          <p:cNvPr id="2" name="Title 1">
+            <a:extLst>
+              <a:ext uri="{FF2B5EF4-FFF2-40B4-BE49-F238E27FC236}">
+                <a16:creationId xmlns:a16="http://schemas.microsoft.com/office/drawing/2014/main" id="{9BD00E70-10B0-5FFE-5DC3-7183662E64C0}"/>
+              </a:ext>
+            </a:extLst>
+          </p:cNvPr>
+          <p:cNvSpPr>
+            <a:spLocks noGrp="1"/>
+          </p:cNvSpPr>
+          <p:nvPr>
+            <p:ph type="title"/>
+          </p:nvPr>
+        </p:nvSpPr>
+        <p:spPr/>
+        <p:txBody>
+          <a:bodyPr/>
+          <a:lstStyle/>
+          <a:p>
+            <a:r>
+              <a:rPr lang="nl-NL" dirty="0"/>
+              <a:t>Samenwerkingsovereenkomst</a:t>
+            </a:r>
+          </a:p>
+        </p:txBody>
+      </p:sp>
+      <p:sp>
+        <p:nvSpPr>
+          <p:cNvPr id="3" name="Content Placeholder 2">
+            <a:extLst>
+              <a:ext uri="{FF2B5EF4-FFF2-40B4-BE49-F238E27FC236}">
+                <a16:creationId xmlns:a16="http://schemas.microsoft.com/office/drawing/2014/main" id="{E80128CF-16D7-8852-D4F9-F9D40995EA86}"/>
+              </a:ext>
+            </a:extLst>
+          </p:cNvPr>
+          <p:cNvSpPr>
+            <a:spLocks noGrp="1"/>
+          </p:cNvSpPr>
+          <p:nvPr>
+            <p:ph idx="1"/>
+          </p:nvPr>
+        </p:nvSpPr>
+        <p:spPr/>
+        <p:txBody>
+          <a:bodyPr/>
+          <a:lstStyle/>
+          <a:p>
+            <a:r>
+              <a:rPr lang="nl-NL" dirty="0"/>
+              <a:t>Afspraken</a:t>
+            </a:r>
+          </a:p>
+          <a:p>
+            <a:r>
+              <a:rPr lang="nl-NL" dirty="0"/>
+              <a:t>Sterke- en Zwakke punten</a:t>
+            </a:r>
+          </a:p>
+          <a:p>
+            <a:r>
+              <a:rPr lang="nl-NL" dirty="0"/>
+              <a:t>Rol/Taakverdeling</a:t>
+            </a:r>
+          </a:p>
+          <a:p>
+            <a:endParaRPr lang="nl-NL" dirty="0"/>
+          </a:p>
+        </p:txBody>
+      </p:sp>
+    </p:spTree>
+    <p:extLst>
+      <p:ext uri="{BB962C8B-B14F-4D97-AF65-F5344CB8AC3E}">
+        <p14:creationId xmlns:p14="http://schemas.microsoft.com/office/powerpoint/2010/main" val="2069905213"/>
       </p:ext>
     </p:extLst>
   </p:cSld>
@@ -9734,6 +10032,23 @@
 </file>
 
 <file path=customXml/item1.xml><?xml version="1.0" encoding="utf-8"?>
+<p:properties xmlns:p="http://schemas.microsoft.com/office/2006/metadata/properties" xmlns:xsi="http://www.w3.org/2001/XMLSchema-instance" xmlns:pc="http://schemas.microsoft.com/office/infopath/2007/PartnerControls">
+  <documentManagement>
+    <_activity xmlns="8d5dcd13-9b93-4860-8686-258dec0e23be" xsi:nil="true"/>
+  </documentManagement>
+</p:properties>
+</file>
+
+<file path=customXml/item2.xml><?xml version="1.0" encoding="utf-8"?>
+<?mso-contentType ?>
+<FormTemplates xmlns="http://schemas.microsoft.com/sharepoint/v3/contenttype/forms">
+  <Display>DocumentLibraryForm</Display>
+  <Edit>DocumentLibraryForm</Edit>
+  <New>DocumentLibraryForm</New>
+</FormTemplates>
+</file>
+
+<file path=customXml/item3.xml><?xml version="1.0" encoding="utf-8"?>
 <ct:contentTypeSchema xmlns:ct="http://schemas.microsoft.com/office/2006/metadata/contentType" xmlns:ma="http://schemas.microsoft.com/office/2006/metadata/properties/metaAttributes" ct:_="" ma:_="" ma:contentTypeName="Document" ma:contentTypeID="0x01010079D7DB9D69D51D4199EBB83E098F6C13" ma:contentTypeVersion="12" ma:contentTypeDescription="Create a new document." ma:contentTypeScope="" ma:versionID="ceb163bb5f87e201cdc653da3b4d8be7">
   <xsd:schema xmlns:xsd="http://www.w3.org/2001/XMLSchema" xmlns:xs="http://www.w3.org/2001/XMLSchema" xmlns:p="http://schemas.microsoft.com/office/2006/metadata/properties" xmlns:ns3="8d5dcd13-9b93-4860-8686-258dec0e23be" targetNamespace="http://schemas.microsoft.com/office/2006/metadata/properties" ma:root="true" ma:fieldsID="28cc82626ae761b4ac7541494d6f1d1e" ns3:_="">
     <xsd:import namespace="8d5dcd13-9b93-4860-8686-258dec0e23be"/>
@@ -9927,24 +10242,31 @@
 </ct:contentTypeSchema>
 </file>
 
-<file path=customXml/item2.xml><?xml version="1.0" encoding="utf-8"?>
-<?mso-contentType ?>
-<FormTemplates xmlns="http://schemas.microsoft.com/sharepoint/v3/contenttype/forms">
-  <Display>DocumentLibraryForm</Display>
-  <Edit>DocumentLibraryForm</Edit>
-  <New>DocumentLibraryForm</New>
-</FormTemplates>
+<file path=customXml/itemProps1.xml><?xml version="1.0" encoding="utf-8"?>
+<ds:datastoreItem xmlns:ds="http://schemas.openxmlformats.org/officeDocument/2006/customXml" ds:itemID="{6BE63DC0-0E79-4D45-AB99-081F8145E24C}">
+  <ds:schemaRefs>
+    <ds:schemaRef ds:uri="http://purl.org/dc/terms/"/>
+    <ds:schemaRef ds:uri="http://schemas.microsoft.com/office/infopath/2007/PartnerControls"/>
+    <ds:schemaRef ds:uri="http://schemas.openxmlformats.org/package/2006/metadata/core-properties"/>
+    <ds:schemaRef ds:uri="http://purl.org/dc/elements/1.1/"/>
+    <ds:schemaRef ds:uri="http://schemas.microsoft.com/office/2006/documentManagement/types"/>
+    <ds:schemaRef ds:uri="http://www.w3.org/XML/1998/namespace"/>
+    <ds:schemaRef ds:uri="8d5dcd13-9b93-4860-8686-258dec0e23be"/>
+    <ds:schemaRef ds:uri="http://schemas.microsoft.com/office/2006/metadata/properties"/>
+    <ds:schemaRef ds:uri="http://purl.org/dc/dcmitype/"/>
+  </ds:schemaRefs>
+</ds:datastoreItem>
 </file>
 
-<file path=customXml/item3.xml><?xml version="1.0" encoding="utf-8"?>
-<p:properties xmlns:p="http://schemas.microsoft.com/office/2006/metadata/properties" xmlns:xsi="http://www.w3.org/2001/XMLSchema-instance" xmlns:pc="http://schemas.microsoft.com/office/infopath/2007/PartnerControls">
-  <documentManagement>
-    <_activity xmlns="8d5dcd13-9b93-4860-8686-258dec0e23be" xsi:nil="true"/>
-  </documentManagement>
-</p:properties>
+<file path=customXml/itemProps2.xml><?xml version="1.0" encoding="utf-8"?>
+<ds:datastoreItem xmlns:ds="http://schemas.openxmlformats.org/officeDocument/2006/customXml" ds:itemID="{33D4CFAA-434D-4462-B62D-1E23E4045646}">
+  <ds:schemaRefs>
+    <ds:schemaRef ds:uri="http://schemas.microsoft.com/sharepoint/v3/contenttype/forms"/>
+  </ds:schemaRefs>
+</ds:datastoreItem>
 </file>
 
-<file path=customXml/itemProps1.xml><?xml version="1.0" encoding="utf-8"?>
+<file path=customXml/itemProps3.xml><?xml version="1.0" encoding="utf-8"?>
 <ds:datastoreItem xmlns:ds="http://schemas.openxmlformats.org/officeDocument/2006/customXml" ds:itemID="{7685628E-9CEE-488E-843E-DA0262089D08}">
   <ds:schemaRefs>
     <ds:schemaRef ds:uri="http://schemas.microsoft.com/office/2006/metadata/contentType"/>
@@ -9960,28 +10282,4 @@
     <ds:schemaRef ds:uri="http://schemas.microsoft.com/internal/obd"/>
   </ds:schemaRefs>
 </ds:datastoreItem>
-</file>
-
-<file path=customXml/itemProps2.xml><?xml version="1.0" encoding="utf-8"?>
-<ds:datastoreItem xmlns:ds="http://schemas.openxmlformats.org/officeDocument/2006/customXml" ds:itemID="{33D4CFAA-434D-4462-B62D-1E23E4045646}">
-  <ds:schemaRefs>
-    <ds:schemaRef ds:uri="http://schemas.microsoft.com/sharepoint/v3/contenttype/forms"/>
-  </ds:schemaRefs>
-</ds:datastoreItem>
-</file>
-
-<file path=customXml/itemProps3.xml><?xml version="1.0" encoding="utf-8"?>
-<ds:datastoreItem xmlns:ds="http://schemas.openxmlformats.org/officeDocument/2006/customXml" ds:itemID="{6BE63DC0-0E79-4D45-AB99-081F8145E24C}">
-  <ds:schemaRefs>
-    <ds:schemaRef ds:uri="http://purl.org/dc/terms/"/>
-    <ds:schemaRef ds:uri="http://schemas.microsoft.com/office/infopath/2007/PartnerControls"/>
-    <ds:schemaRef ds:uri="http://schemas.openxmlformats.org/package/2006/metadata/core-properties"/>
-    <ds:schemaRef ds:uri="http://purl.org/dc/elements/1.1/"/>
-    <ds:schemaRef ds:uri="http://schemas.microsoft.com/office/2006/documentManagement/types"/>
-    <ds:schemaRef ds:uri="http://www.w3.org/XML/1998/namespace"/>
-    <ds:schemaRef ds:uri="8d5dcd13-9b93-4860-8686-258dec0e23be"/>
-    <ds:schemaRef ds:uri="http://schemas.microsoft.com/office/2006/metadata/properties"/>
-    <ds:schemaRef ds:uri="http://purl.org/dc/dcmitype/"/>
-  </ds:schemaRefs>
-</ds:datastoreItem>
 </file>
</xml_diff>